<commit_message>
I added the Endurance and Range data 3
</commit_message>
<xml_diff>
--- a/presentation/Chapters Autopilot & vision and OA.pptx
+++ b/presentation/Chapters Autopilot & vision and OA.pptx
@@ -46,6 +46,8 @@
     <p:sldId id="295" r:id="rId40"/>
     <p:sldId id="296" r:id="rId41"/>
     <p:sldId id="293" r:id="rId42"/>
+    <p:sldId id="298" r:id="rId43"/>
+    <p:sldId id="299" r:id="rId44"/>
   </p:sldIdLst>
   <p:sldSz cx="12192000" cy="6858000"/>
   <p:notesSz cx="6858000" cy="9144000"/>
@@ -278,7 +280,7 @@
           <a:p>
             <a:fld id="{DFE82FEE-1807-4174-AFF6-FEFC4FFA0319}" type="datetimeFigureOut">
               <a:rPr lang="en-US" smtClean="0"/>
-              <a:t>6/30/2019</a:t>
+              <a:t>7/2/2019</a:t>
             </a:fld>
             <a:endParaRPr lang="en-US"/>
           </a:p>
@@ -448,7 +450,7 @@
           <a:p>
             <a:fld id="{DFE82FEE-1807-4174-AFF6-FEFC4FFA0319}" type="datetimeFigureOut">
               <a:rPr lang="en-US" smtClean="0"/>
-              <a:t>6/30/2019</a:t>
+              <a:t>7/2/2019</a:t>
             </a:fld>
             <a:endParaRPr lang="en-US"/>
           </a:p>
@@ -628,7 +630,7 @@
           <a:p>
             <a:fld id="{DFE82FEE-1807-4174-AFF6-FEFC4FFA0319}" type="datetimeFigureOut">
               <a:rPr lang="en-US" smtClean="0"/>
-              <a:t>6/30/2019</a:t>
+              <a:t>7/2/2019</a:t>
             </a:fld>
             <a:endParaRPr lang="en-US"/>
           </a:p>
@@ -798,7 +800,7 @@
           <a:p>
             <a:fld id="{DFE82FEE-1807-4174-AFF6-FEFC4FFA0319}" type="datetimeFigureOut">
               <a:rPr lang="en-US" smtClean="0"/>
-              <a:t>6/30/2019</a:t>
+              <a:t>7/2/2019</a:t>
             </a:fld>
             <a:endParaRPr lang="en-US"/>
           </a:p>
@@ -1044,7 +1046,7 @@
           <a:p>
             <a:fld id="{DFE82FEE-1807-4174-AFF6-FEFC4FFA0319}" type="datetimeFigureOut">
               <a:rPr lang="en-US" smtClean="0"/>
-              <a:t>6/30/2019</a:t>
+              <a:t>7/2/2019</a:t>
             </a:fld>
             <a:endParaRPr lang="en-US"/>
           </a:p>
@@ -1276,7 +1278,7 @@
           <a:p>
             <a:fld id="{DFE82FEE-1807-4174-AFF6-FEFC4FFA0319}" type="datetimeFigureOut">
               <a:rPr lang="en-US" smtClean="0"/>
-              <a:t>6/30/2019</a:t>
+              <a:t>7/2/2019</a:t>
             </a:fld>
             <a:endParaRPr lang="en-US"/>
           </a:p>
@@ -1643,7 +1645,7 @@
           <a:p>
             <a:fld id="{DFE82FEE-1807-4174-AFF6-FEFC4FFA0319}" type="datetimeFigureOut">
               <a:rPr lang="en-US" smtClean="0"/>
-              <a:t>6/30/2019</a:t>
+              <a:t>7/2/2019</a:t>
             </a:fld>
             <a:endParaRPr lang="en-US"/>
           </a:p>
@@ -1761,7 +1763,7 @@
           <a:p>
             <a:fld id="{DFE82FEE-1807-4174-AFF6-FEFC4FFA0319}" type="datetimeFigureOut">
               <a:rPr lang="en-US" smtClean="0"/>
-              <a:t>6/30/2019</a:t>
+              <a:t>7/2/2019</a:t>
             </a:fld>
             <a:endParaRPr lang="en-US"/>
           </a:p>
@@ -1856,7 +1858,7 @@
           <a:p>
             <a:fld id="{DFE82FEE-1807-4174-AFF6-FEFC4FFA0319}" type="datetimeFigureOut">
               <a:rPr lang="en-US" smtClean="0"/>
-              <a:t>6/30/2019</a:t>
+              <a:t>7/2/2019</a:t>
             </a:fld>
             <a:endParaRPr lang="en-US"/>
           </a:p>
@@ -2133,7 +2135,7 @@
           <a:p>
             <a:fld id="{DFE82FEE-1807-4174-AFF6-FEFC4FFA0319}" type="datetimeFigureOut">
               <a:rPr lang="en-US" smtClean="0"/>
-              <a:t>6/30/2019</a:t>
+              <a:t>7/2/2019</a:t>
             </a:fld>
             <a:endParaRPr lang="en-US"/>
           </a:p>
@@ -2386,7 +2388,7 @@
           <a:p>
             <a:fld id="{DFE82FEE-1807-4174-AFF6-FEFC4FFA0319}" type="datetimeFigureOut">
               <a:rPr lang="en-US" smtClean="0"/>
-              <a:t>6/30/2019</a:t>
+              <a:t>7/2/2019</a:t>
             </a:fld>
             <a:endParaRPr lang="en-US"/>
           </a:p>
@@ -2599,7 +2601,7 @@
           <a:p>
             <a:fld id="{DFE82FEE-1807-4174-AFF6-FEFC4FFA0319}" type="datetimeFigureOut">
               <a:rPr lang="en-US" smtClean="0"/>
-              <a:t>6/30/2019</a:t>
+              <a:t>7/2/2019</a:t>
             </a:fld>
             <a:endParaRPr lang="en-US"/>
           </a:p>
@@ -7697,6 +7699,218 @@
 </p:sld>
 </file>
 
+<file path=ppt/slides/slide42.xml><?xml version="1.0" encoding="utf-8"?>
+<p:sld xmlns:a="http://schemas.openxmlformats.org/drawingml/2006/main" xmlns:r="http://schemas.openxmlformats.org/officeDocument/2006/relationships" xmlns:p="http://schemas.openxmlformats.org/presentationml/2006/main">
+  <p:cSld>
+    <p:spTree>
+      <p:nvGrpSpPr>
+        <p:cNvPr id="1" name=""/>
+        <p:cNvGrpSpPr/>
+        <p:nvPr/>
+      </p:nvGrpSpPr>
+      <p:grpSpPr>
+        <a:xfrm>
+          <a:off x="0" y="0"/>
+          <a:ext cx="0" cy="0"/>
+          <a:chOff x="0" y="0"/>
+          <a:chExt cx="0" cy="0"/>
+        </a:xfrm>
+      </p:grpSpPr>
+      <p:sp>
+        <p:nvSpPr>
+          <p:cNvPr id="2" name="Title 1"/>
+          <p:cNvSpPr>
+            <a:spLocks noGrp="1"/>
+          </p:cNvSpPr>
+          <p:nvPr>
+            <p:ph type="title"/>
+          </p:nvPr>
+        </p:nvSpPr>
+        <p:spPr/>
+        <p:txBody>
+          <a:bodyPr/>
+          <a:lstStyle/>
+          <a:p>
+            <a:r>
+              <a:rPr lang="en-US" b="1" dirty="0" smtClean="0"/>
+              <a:t>Implementation</a:t>
+            </a:r>
+            <a:endParaRPr lang="en-US" b="1" dirty="0"/>
+          </a:p>
+        </p:txBody>
+      </p:sp>
+      <p:sp>
+        <p:nvSpPr>
+          <p:cNvPr id="4" name="Content Placeholder 3"/>
+          <p:cNvSpPr>
+            <a:spLocks noGrp="1"/>
+          </p:cNvSpPr>
+          <p:nvPr>
+            <p:ph idx="1"/>
+          </p:nvPr>
+        </p:nvSpPr>
+        <p:spPr/>
+        <p:txBody>
+          <a:bodyPr/>
+          <a:lstStyle/>
+          <a:p>
+            <a:r>
+              <a:rPr lang="en-US" b="1" smtClean="0"/>
+              <a:t>Why  ROS ?</a:t>
+            </a:r>
+            <a:r>
+              <a:rPr lang="en-US" dirty="0" smtClean="0"/>
+              <a:t/>
+            </a:r>
+            <a:br>
+              <a:rPr lang="en-US" dirty="0" smtClean="0"/>
+            </a:br>
+            <a:r>
+              <a:rPr lang="en-US" dirty="0" smtClean="0"/>
+              <a:t> </a:t>
+            </a:r>
+            <a:endParaRPr lang="en-US" dirty="0"/>
+          </a:p>
+        </p:txBody>
+      </p:sp>
+      <p:pic>
+        <p:nvPicPr>
+          <p:cNvPr id="2052" name="Picture 4" descr="Robot Operating System Logo"/>
+          <p:cNvPicPr>
+            <a:picLocks noChangeAspect="1" noChangeArrowheads="1"/>
+          </p:cNvPicPr>
+          <p:nvPr/>
+        </p:nvPicPr>
+        <p:blipFill>
+          <a:blip r:embed="rId2" cstate="print">
+            <a:extLst>
+              <a:ext uri="{28A0092B-C50C-407E-A947-70E740481C1C}">
+                <a14:useLocalDpi xmlns:a14="http://schemas.microsoft.com/office/drawing/2010/main" val="0"/>
+              </a:ext>
+            </a:extLst>
+          </a:blip>
+          <a:srcRect/>
+          <a:stretch>
+            <a:fillRect/>
+          </a:stretch>
+        </p:blipFill>
+        <p:spPr bwMode="auto">
+          <a:xfrm>
+            <a:off x="5046422" y="231819"/>
+            <a:ext cx="4535460" cy="1005226"/>
+          </a:xfrm>
+          <a:prstGeom prst="rect">
+            <a:avLst/>
+          </a:prstGeom>
+          <a:noFill/>
+          <a:extLst>
+            <a:ext uri="{909E8E84-426E-40DD-AFC4-6F175D3DCCD1}">
+              <a14:hiddenFill xmlns:a14="http://schemas.microsoft.com/office/drawing/2010/main">
+                <a:solidFill>
+                  <a:srgbClr val="FFFFFF"/>
+                </a:solidFill>
+              </a14:hiddenFill>
+            </a:ext>
+          </a:extLst>
+        </p:spPr>
+      </p:pic>
+      <p:pic>
+        <p:nvPicPr>
+          <p:cNvPr id="2053" name="Picture 5"/>
+          <p:cNvPicPr>
+            <a:picLocks noChangeAspect="1" noChangeArrowheads="1"/>
+          </p:cNvPicPr>
+          <p:nvPr/>
+        </p:nvPicPr>
+        <p:blipFill>
+          <a:blip r:embed="rId3">
+            <a:extLst>
+              <a:ext uri="{28A0092B-C50C-407E-A947-70E740481C1C}">
+                <a14:useLocalDpi xmlns:a14="http://schemas.microsoft.com/office/drawing/2010/main" val="0"/>
+              </a:ext>
+            </a:extLst>
+          </a:blip>
+          <a:srcRect/>
+          <a:stretch>
+            <a:fillRect/>
+          </a:stretch>
+        </p:blipFill>
+        <p:spPr bwMode="auto">
+          <a:xfrm>
+            <a:off x="1184857" y="2247910"/>
+            <a:ext cx="10010708" cy="4320316"/>
+          </a:xfrm>
+          <a:prstGeom prst="rect">
+            <a:avLst/>
+          </a:prstGeom>
+          <a:noFill/>
+          <a:ln>
+            <a:noFill/>
+          </a:ln>
+          <a:extLst>
+            <a:ext uri="{909E8E84-426E-40DD-AFC4-6F175D3DCCD1}">
+              <a14:hiddenFill xmlns:a14="http://schemas.microsoft.com/office/drawing/2010/main">
+                <a:solidFill>
+                  <a:schemeClr val="accent1"/>
+                </a:solidFill>
+              </a14:hiddenFill>
+            </a:ext>
+            <a:ext uri="{91240B29-F687-4F45-9708-019B960494DF}">
+              <a14:hiddenLine xmlns:a14="http://schemas.microsoft.com/office/drawing/2010/main" w="9525">
+                <a:solidFill>
+                  <a:schemeClr val="tx1"/>
+                </a:solidFill>
+                <a:miter lim="800000"/>
+                <a:headEnd/>
+                <a:tailEnd/>
+              </a14:hiddenLine>
+            </a:ext>
+          </a:extLst>
+        </p:spPr>
+      </p:pic>
+    </p:spTree>
+    <p:extLst>
+      <p:ext uri="{BB962C8B-B14F-4D97-AF65-F5344CB8AC3E}">
+        <p14:creationId xmlns:p14="http://schemas.microsoft.com/office/powerpoint/2010/main" val="1572679763"/>
+      </p:ext>
+    </p:extLst>
+  </p:cSld>
+  <p:clrMapOvr>
+    <a:masterClrMapping/>
+  </p:clrMapOvr>
+</p:sld>
+</file>
+
+<file path=ppt/slides/slide43.xml><?xml version="1.0" encoding="utf-8"?>
+<p:sld xmlns:a="http://schemas.openxmlformats.org/drawingml/2006/main" xmlns:r="http://schemas.openxmlformats.org/officeDocument/2006/relationships" xmlns:p="http://schemas.openxmlformats.org/presentationml/2006/main">
+  <p:cSld>
+    <p:spTree>
+      <p:nvGrpSpPr>
+        <p:cNvPr id="1" name=""/>
+        <p:cNvGrpSpPr/>
+        <p:nvPr/>
+      </p:nvGrpSpPr>
+      <p:grpSpPr>
+        <a:xfrm>
+          <a:off x="0" y="0"/>
+          <a:ext cx="0" cy="0"/>
+          <a:chOff x="0" y="0"/>
+          <a:chExt cx="0" cy="0"/>
+        </a:xfrm>
+      </p:grpSpPr>
+    </p:spTree>
+    <p:extLst>
+      <p:ext uri="{BB962C8B-B14F-4D97-AF65-F5344CB8AC3E}">
+        <p14:creationId xmlns:p14="http://schemas.microsoft.com/office/powerpoint/2010/main" val="1237416751"/>
+      </p:ext>
+    </p:extLst>
+  </p:cSld>
+  <p:clrMapOvr>
+    <a:masterClrMapping/>
+  </p:clrMapOvr>
+</p:sld>
+</file>
+
 <file path=ppt/slides/slide5.xml><?xml version="1.0" encoding="utf-8"?>
 <p:sld xmlns:a="http://schemas.openxmlformats.org/drawingml/2006/main" xmlns:r="http://schemas.openxmlformats.org/officeDocument/2006/relationships" xmlns:p="http://schemas.openxmlformats.org/presentationml/2006/main">
   <p:cSld>
@@ -7810,7 +8024,7 @@
           <p:nvPr/>
         </p:nvPicPr>
         <p:blipFill rotWithShape="1">
-          <a:blip r:embed="rId3">
+          <a:blip r:embed="rId2">
             <a:extLst>
               <a:ext uri="{28A0092B-C50C-407E-A947-70E740481C1C}">
                 <a14:useLocalDpi xmlns:a14="http://schemas.microsoft.com/office/drawing/2010/main" val="0"/>
@@ -7841,7 +8055,7 @@
           </p:nvPr>
         </p:nvPicPr>
         <p:blipFill>
-          <a:blip r:embed="rId4">
+          <a:blip r:embed="rId3">
             <a:extLst>
               <a:ext uri="{28A0092B-C50C-407E-A947-70E740481C1C}">
                 <a14:useLocalDpi xmlns:a14="http://schemas.microsoft.com/office/drawing/2010/main" val="0"/>
@@ -8623,7 +8837,7 @@
   <a:extraClrSchemeLst/>
   <a:extLst>
     <a:ext uri="{05A4C25C-085E-4340-85A3-A5531E510DB2}">
-      <thm15:themeFamily xmlns:thm15="http://schemas.microsoft.com/office/thememl/2012/main" name="Office Theme" id="{62F939B6-93AF-4DB8-9C6B-D6C7DFDC589F}" vid="{4A3C46E8-61CC-4603-A589-7422A47A8E4A}"/>
+      <thm15:themeFamily xmlns:thm15="http://schemas.microsoft.com/office/thememl/2012/main" xmlns="" name="Office Theme" id="{62F939B6-93AF-4DB8-9C6B-D6C7DFDC589F}" vid="{4A3C46E8-61CC-4603-A589-7422A47A8E4A}"/>
     </a:ext>
   </a:extLst>
 </a:theme>

</xml_diff>